<commit_message>
Improved description in Internationalization.rst(applied review comments). #18
</commit_message>
<xml_diff>
--- a/source/ArchitectureInDetail/images_Internationalization/materialInternationalization.pptx
+++ b/source/ArchitectureInDetail/images_Internationalization/materialInternationalization.pptx
@@ -194,7 +194,7 @@
             <a:fld id="{3BB47352-BF5A-4CD2-B029-996118CD8E01}" type="datetimeFigureOut">
               <a:rPr kumimoji="1" lang="ja-JP" altLang="en-US" smtClean="0"/>
               <a:pPr/>
-              <a:t>2013/11/28</a:t>
+              <a:t>2014/12/26</a:t>
             </a:fld>
             <a:endParaRPr kumimoji="1" lang="ja-JP" altLang="en-US" dirty="0"/>
           </a:p>
@@ -386,7 +386,7 @@
             <a:fld id="{003CFFA3-9D07-4088-826B-DF328166082C}" type="slidenum">
               <a:rPr kumimoji="1" lang="ja-JP" altLang="en-US" smtClean="0"/>
               <a:pPr/>
-              <a:t>&lt;#&gt;</a:t>
+              <a:t>‹#›</a:t>
             </a:fld>
             <a:endParaRPr kumimoji="1" lang="ja-JP" altLang="en-US" dirty="0"/>
           </a:p>
@@ -395,7 +395,7 @@
     </p:spTree>
     <p:extLst>
       <p:ext uri="{BB962C8B-B14F-4D97-AF65-F5344CB8AC3E}">
-        <p14:creationId xmlns="" xmlns:p14="http://schemas.microsoft.com/office/powerpoint/2010/main" val="1563212060"/>
+        <p14:creationId xmlns:p14="http://schemas.microsoft.com/office/powerpoint/2010/main" val="1563212060"/>
       </p:ext>
     </p:extLst>
   </p:cSld>
@@ -677,7 +677,7 @@
             <a:fld id="{7B9B12EC-6AA0-374B-A2D3-850081A07A26}" type="datetimeFigureOut">
               <a:rPr kumimoji="1" lang="ja-JP" altLang="en-US" smtClean="0"/>
               <a:pPr/>
-              <a:t>2013/11/28</a:t>
+              <a:t>2014/12/26</a:t>
             </a:fld>
             <a:endParaRPr kumimoji="1" lang="ja-JP" altLang="en-US" dirty="0"/>
           </a:p>
@@ -720,7 +720,7 @@
             <a:fld id="{767EF739-006C-E447-A3B9-2B495A864FAC}" type="slidenum">
               <a:rPr kumimoji="1" lang="ja-JP" altLang="en-US" smtClean="0"/>
               <a:pPr/>
-              <a:t>&lt;#&gt;</a:t>
+              <a:t>‹#›</a:t>
             </a:fld>
             <a:endParaRPr kumimoji="1" lang="ja-JP" altLang="en-US" dirty="0"/>
           </a:p>
@@ -729,7 +729,7 @@
     </p:spTree>
     <p:extLst>
       <p:ext uri="{BB962C8B-B14F-4D97-AF65-F5344CB8AC3E}">
-        <p14:creationId xmlns="" xmlns:p14="http://schemas.microsoft.com/office/powerpoint/2010/main" val="2957268178"/>
+        <p14:creationId xmlns:p14="http://schemas.microsoft.com/office/powerpoint/2010/main" val="2957268178"/>
       </p:ext>
     </p:extLst>
   </p:cSld>
@@ -881,7 +881,7 @@
             <a:fld id="{7B9B12EC-6AA0-374B-A2D3-850081A07A26}" type="datetimeFigureOut">
               <a:rPr kumimoji="1" lang="ja-JP" altLang="en-US" smtClean="0"/>
               <a:pPr/>
-              <a:t>2013/11/28</a:t>
+              <a:t>2014/12/26</a:t>
             </a:fld>
             <a:endParaRPr kumimoji="1" lang="ja-JP" altLang="en-US" dirty="0"/>
           </a:p>
@@ -924,7 +924,7 @@
             <a:fld id="{767EF739-006C-E447-A3B9-2B495A864FAC}" type="slidenum">
               <a:rPr kumimoji="1" lang="ja-JP" altLang="en-US" smtClean="0"/>
               <a:pPr/>
-              <a:t>&lt;#&gt;</a:t>
+              <a:t>‹#›</a:t>
             </a:fld>
             <a:endParaRPr kumimoji="1" lang="ja-JP" altLang="en-US" dirty="0"/>
           </a:p>
@@ -933,7 +933,7 @@
     </p:spTree>
     <p:extLst>
       <p:ext uri="{BB962C8B-B14F-4D97-AF65-F5344CB8AC3E}">
-        <p14:creationId xmlns="" xmlns:p14="http://schemas.microsoft.com/office/powerpoint/2010/main" val="99248395"/>
+        <p14:creationId xmlns:p14="http://schemas.microsoft.com/office/powerpoint/2010/main" val="99248395"/>
       </p:ext>
     </p:extLst>
   </p:cSld>
@@ -1095,7 +1095,7 @@
             <a:fld id="{7B9B12EC-6AA0-374B-A2D3-850081A07A26}" type="datetimeFigureOut">
               <a:rPr kumimoji="1" lang="ja-JP" altLang="en-US" smtClean="0"/>
               <a:pPr/>
-              <a:t>2013/11/28</a:t>
+              <a:t>2014/12/26</a:t>
             </a:fld>
             <a:endParaRPr kumimoji="1" lang="ja-JP" altLang="en-US" dirty="0"/>
           </a:p>
@@ -1138,7 +1138,7 @@
             <a:fld id="{767EF739-006C-E447-A3B9-2B495A864FAC}" type="slidenum">
               <a:rPr kumimoji="1" lang="ja-JP" altLang="en-US" smtClean="0"/>
               <a:pPr/>
-              <a:t>&lt;#&gt;</a:t>
+              <a:t>‹#›</a:t>
             </a:fld>
             <a:endParaRPr kumimoji="1" lang="ja-JP" altLang="en-US" dirty="0"/>
           </a:p>
@@ -1147,7 +1147,7 @@
     </p:spTree>
     <p:extLst>
       <p:ext uri="{BB962C8B-B14F-4D97-AF65-F5344CB8AC3E}">
-        <p14:creationId xmlns="" xmlns:p14="http://schemas.microsoft.com/office/powerpoint/2010/main" val="75369614"/>
+        <p14:creationId xmlns:p14="http://schemas.microsoft.com/office/powerpoint/2010/main" val="75369614"/>
       </p:ext>
     </p:extLst>
   </p:cSld>
@@ -1299,7 +1299,7 @@
             <a:fld id="{7B9B12EC-6AA0-374B-A2D3-850081A07A26}" type="datetimeFigureOut">
               <a:rPr kumimoji="1" lang="ja-JP" altLang="en-US" smtClean="0"/>
               <a:pPr/>
-              <a:t>2013/11/28</a:t>
+              <a:t>2014/12/26</a:t>
             </a:fld>
             <a:endParaRPr kumimoji="1" lang="ja-JP" altLang="en-US" dirty="0"/>
           </a:p>
@@ -1342,7 +1342,7 @@
             <a:fld id="{767EF739-006C-E447-A3B9-2B495A864FAC}" type="slidenum">
               <a:rPr kumimoji="1" lang="ja-JP" altLang="en-US" smtClean="0"/>
               <a:pPr/>
-              <a:t>&lt;#&gt;</a:t>
+              <a:t>‹#›</a:t>
             </a:fld>
             <a:endParaRPr kumimoji="1" lang="ja-JP" altLang="en-US" dirty="0"/>
           </a:p>
@@ -1351,7 +1351,7 @@
     </p:spTree>
     <p:extLst>
       <p:ext uri="{BB962C8B-B14F-4D97-AF65-F5344CB8AC3E}">
-        <p14:creationId xmlns="" xmlns:p14="http://schemas.microsoft.com/office/powerpoint/2010/main" val="956610528"/>
+        <p14:creationId xmlns:p14="http://schemas.microsoft.com/office/powerpoint/2010/main" val="956610528"/>
       </p:ext>
     </p:extLst>
   </p:cSld>
@@ -1547,7 +1547,7 @@
             <a:fld id="{7B9B12EC-6AA0-374B-A2D3-850081A07A26}" type="datetimeFigureOut">
               <a:rPr kumimoji="1" lang="ja-JP" altLang="en-US" smtClean="0"/>
               <a:pPr/>
-              <a:t>2013/11/28</a:t>
+              <a:t>2014/12/26</a:t>
             </a:fld>
             <a:endParaRPr kumimoji="1" lang="ja-JP" altLang="en-US" dirty="0"/>
           </a:p>
@@ -1590,7 +1590,7 @@
             <a:fld id="{767EF739-006C-E447-A3B9-2B495A864FAC}" type="slidenum">
               <a:rPr kumimoji="1" lang="ja-JP" altLang="en-US" smtClean="0"/>
               <a:pPr/>
-              <a:t>&lt;#&gt;</a:t>
+              <a:t>‹#›</a:t>
             </a:fld>
             <a:endParaRPr kumimoji="1" lang="ja-JP" altLang="en-US" dirty="0"/>
           </a:p>
@@ -1599,7 +1599,7 @@
     </p:spTree>
     <p:extLst>
       <p:ext uri="{BB962C8B-B14F-4D97-AF65-F5344CB8AC3E}">
-        <p14:creationId xmlns="" xmlns:p14="http://schemas.microsoft.com/office/powerpoint/2010/main" val="492095304"/>
+        <p14:creationId xmlns:p14="http://schemas.microsoft.com/office/powerpoint/2010/main" val="492095304"/>
       </p:ext>
     </p:extLst>
   </p:cSld>
@@ -1901,7 +1901,7 @@
             <a:fld id="{7B9B12EC-6AA0-374B-A2D3-850081A07A26}" type="datetimeFigureOut">
               <a:rPr kumimoji="1" lang="ja-JP" altLang="en-US" smtClean="0"/>
               <a:pPr/>
-              <a:t>2013/11/28</a:t>
+              <a:t>2014/12/26</a:t>
             </a:fld>
             <a:endParaRPr kumimoji="1" lang="ja-JP" altLang="en-US" dirty="0"/>
           </a:p>
@@ -1944,7 +1944,7 @@
             <a:fld id="{767EF739-006C-E447-A3B9-2B495A864FAC}" type="slidenum">
               <a:rPr kumimoji="1" lang="ja-JP" altLang="en-US" smtClean="0"/>
               <a:pPr/>
-              <a:t>&lt;#&gt;</a:t>
+              <a:t>‹#›</a:t>
             </a:fld>
             <a:endParaRPr kumimoji="1" lang="ja-JP" altLang="en-US" dirty="0"/>
           </a:p>
@@ -1953,7 +1953,7 @@
     </p:spTree>
     <p:extLst>
       <p:ext uri="{BB962C8B-B14F-4D97-AF65-F5344CB8AC3E}">
-        <p14:creationId xmlns="" xmlns:p14="http://schemas.microsoft.com/office/powerpoint/2010/main" val="1557712202"/>
+        <p14:creationId xmlns:p14="http://schemas.microsoft.com/office/powerpoint/2010/main" val="1557712202"/>
       </p:ext>
     </p:extLst>
   </p:cSld>
@@ -2389,7 +2389,7 @@
             <a:fld id="{7B9B12EC-6AA0-374B-A2D3-850081A07A26}" type="datetimeFigureOut">
               <a:rPr kumimoji="1" lang="ja-JP" altLang="en-US" smtClean="0"/>
               <a:pPr/>
-              <a:t>2013/11/28</a:t>
+              <a:t>2014/12/26</a:t>
             </a:fld>
             <a:endParaRPr kumimoji="1" lang="ja-JP" altLang="en-US" dirty="0"/>
           </a:p>
@@ -2432,7 +2432,7 @@
             <a:fld id="{767EF739-006C-E447-A3B9-2B495A864FAC}" type="slidenum">
               <a:rPr kumimoji="1" lang="ja-JP" altLang="en-US" smtClean="0"/>
               <a:pPr/>
-              <a:t>&lt;#&gt;</a:t>
+              <a:t>‹#›</a:t>
             </a:fld>
             <a:endParaRPr kumimoji="1" lang="ja-JP" altLang="en-US" dirty="0"/>
           </a:p>
@@ -2441,7 +2441,7 @@
     </p:spTree>
     <p:extLst>
       <p:ext uri="{BB962C8B-B14F-4D97-AF65-F5344CB8AC3E}">
-        <p14:creationId xmlns="" xmlns:p14="http://schemas.microsoft.com/office/powerpoint/2010/main" val="638338655"/>
+        <p14:creationId xmlns:p14="http://schemas.microsoft.com/office/powerpoint/2010/main" val="638338655"/>
       </p:ext>
     </p:extLst>
   </p:cSld>
@@ -2509,7 +2509,7 @@
             <a:fld id="{7B9B12EC-6AA0-374B-A2D3-850081A07A26}" type="datetimeFigureOut">
               <a:rPr kumimoji="1" lang="ja-JP" altLang="en-US" smtClean="0"/>
               <a:pPr/>
-              <a:t>2013/11/28</a:t>
+              <a:t>2014/12/26</a:t>
             </a:fld>
             <a:endParaRPr kumimoji="1" lang="ja-JP" altLang="en-US" dirty="0"/>
           </a:p>
@@ -2552,7 +2552,7 @@
             <a:fld id="{767EF739-006C-E447-A3B9-2B495A864FAC}" type="slidenum">
               <a:rPr kumimoji="1" lang="ja-JP" altLang="en-US" smtClean="0"/>
               <a:pPr/>
-              <a:t>&lt;#&gt;</a:t>
+              <a:t>‹#›</a:t>
             </a:fld>
             <a:endParaRPr kumimoji="1" lang="ja-JP" altLang="en-US" dirty="0"/>
           </a:p>
@@ -2561,7 +2561,7 @@
     </p:spTree>
     <p:extLst>
       <p:ext uri="{BB962C8B-B14F-4D97-AF65-F5344CB8AC3E}">
-        <p14:creationId xmlns="" xmlns:p14="http://schemas.microsoft.com/office/powerpoint/2010/main" val="2063778013"/>
+        <p14:creationId xmlns:p14="http://schemas.microsoft.com/office/powerpoint/2010/main" val="2063778013"/>
       </p:ext>
     </p:extLst>
   </p:cSld>
@@ -2606,7 +2606,7 @@
             <a:fld id="{7B9B12EC-6AA0-374B-A2D3-850081A07A26}" type="datetimeFigureOut">
               <a:rPr kumimoji="1" lang="ja-JP" altLang="en-US" smtClean="0"/>
               <a:pPr/>
-              <a:t>2013/11/28</a:t>
+              <a:t>2014/12/26</a:t>
             </a:fld>
             <a:endParaRPr kumimoji="1" lang="ja-JP" altLang="en-US" dirty="0"/>
           </a:p>
@@ -2649,7 +2649,7 @@
             <a:fld id="{767EF739-006C-E447-A3B9-2B495A864FAC}" type="slidenum">
               <a:rPr kumimoji="1" lang="ja-JP" altLang="en-US" smtClean="0"/>
               <a:pPr/>
-              <a:t>&lt;#&gt;</a:t>
+              <a:t>‹#›</a:t>
             </a:fld>
             <a:endParaRPr kumimoji="1" lang="ja-JP" altLang="en-US" dirty="0"/>
           </a:p>
@@ -2658,7 +2658,7 @@
     </p:spTree>
     <p:extLst>
       <p:ext uri="{BB962C8B-B14F-4D97-AF65-F5344CB8AC3E}">
-        <p14:creationId xmlns="" xmlns:p14="http://schemas.microsoft.com/office/powerpoint/2010/main" val="1575323657"/>
+        <p14:creationId xmlns:p14="http://schemas.microsoft.com/office/powerpoint/2010/main" val="1575323657"/>
       </p:ext>
     </p:extLst>
   </p:cSld>
@@ -2917,7 +2917,7 @@
             <a:fld id="{7B9B12EC-6AA0-374B-A2D3-850081A07A26}" type="datetimeFigureOut">
               <a:rPr kumimoji="1" lang="ja-JP" altLang="en-US" smtClean="0"/>
               <a:pPr/>
-              <a:t>2013/11/28</a:t>
+              <a:t>2014/12/26</a:t>
             </a:fld>
             <a:endParaRPr kumimoji="1" lang="ja-JP" altLang="en-US" dirty="0"/>
           </a:p>
@@ -2960,7 +2960,7 @@
             <a:fld id="{767EF739-006C-E447-A3B9-2B495A864FAC}" type="slidenum">
               <a:rPr kumimoji="1" lang="ja-JP" altLang="en-US" smtClean="0"/>
               <a:pPr/>
-              <a:t>&lt;#&gt;</a:t>
+              <a:t>‹#›</a:t>
             </a:fld>
             <a:endParaRPr kumimoji="1" lang="ja-JP" altLang="en-US" dirty="0"/>
           </a:p>
@@ -2969,7 +2969,7 @@
     </p:spTree>
     <p:extLst>
       <p:ext uri="{BB962C8B-B14F-4D97-AF65-F5344CB8AC3E}">
-        <p14:creationId xmlns="" xmlns:p14="http://schemas.microsoft.com/office/powerpoint/2010/main" val="3549694789"/>
+        <p14:creationId xmlns:p14="http://schemas.microsoft.com/office/powerpoint/2010/main" val="3549694789"/>
       </p:ext>
     </p:extLst>
   </p:cSld>
@@ -3172,7 +3172,7 @@
             <a:fld id="{7B9B12EC-6AA0-374B-A2D3-850081A07A26}" type="datetimeFigureOut">
               <a:rPr kumimoji="1" lang="ja-JP" altLang="en-US" smtClean="0"/>
               <a:pPr/>
-              <a:t>2013/11/28</a:t>
+              <a:t>2014/12/26</a:t>
             </a:fld>
             <a:endParaRPr kumimoji="1" lang="ja-JP" altLang="en-US" dirty="0"/>
           </a:p>
@@ -3215,7 +3215,7 @@
             <a:fld id="{767EF739-006C-E447-A3B9-2B495A864FAC}" type="slidenum">
               <a:rPr kumimoji="1" lang="ja-JP" altLang="en-US" smtClean="0"/>
               <a:pPr/>
-              <a:t>&lt;#&gt;</a:t>
+              <a:t>‹#›</a:t>
             </a:fld>
             <a:endParaRPr kumimoji="1" lang="ja-JP" altLang="en-US" dirty="0"/>
           </a:p>
@@ -3224,7 +3224,7 @@
     </p:spTree>
     <p:extLst>
       <p:ext uri="{BB962C8B-B14F-4D97-AF65-F5344CB8AC3E}">
-        <p14:creationId xmlns="" xmlns:p14="http://schemas.microsoft.com/office/powerpoint/2010/main" val="2928006269"/>
+        <p14:creationId xmlns:p14="http://schemas.microsoft.com/office/powerpoint/2010/main" val="2928006269"/>
       </p:ext>
     </p:extLst>
   </p:cSld>
@@ -3419,7 +3419,7 @@
             <a:fld id="{7B9B12EC-6AA0-374B-A2D3-850081A07A26}" type="datetimeFigureOut">
               <a:rPr kumimoji="1" lang="ja-JP" altLang="en-US" smtClean="0"/>
               <a:pPr/>
-              <a:t>2013/11/28</a:t>
+              <a:t>2014/12/26</a:t>
             </a:fld>
             <a:endParaRPr kumimoji="1" lang="ja-JP" altLang="en-US" dirty="0"/>
           </a:p>
@@ -3498,7 +3498,7 @@
             <a:fld id="{767EF739-006C-E447-A3B9-2B495A864FAC}" type="slidenum">
               <a:rPr kumimoji="1" lang="ja-JP" altLang="en-US" smtClean="0"/>
               <a:pPr/>
-              <a:t>&lt;#&gt;</a:t>
+              <a:t>‹#›</a:t>
             </a:fld>
             <a:endParaRPr kumimoji="1" lang="ja-JP" altLang="en-US" dirty="0"/>
           </a:p>
@@ -3507,7 +3507,7 @@
     </p:spTree>
     <p:extLst>
       <p:ext uri="{BB962C8B-B14F-4D97-AF65-F5344CB8AC3E}">
-        <p14:creationId xmlns="" xmlns:p14="http://schemas.microsoft.com/office/powerpoint/2010/main" val="1919167372"/>
+        <p14:creationId xmlns:p14="http://schemas.microsoft.com/office/powerpoint/2010/main" val="1919167372"/>
       </p:ext>
     </p:extLst>
   </p:cSld>
@@ -4966,7 +4966,7 @@
         </p:blipFill>
         <p:spPr bwMode="auto">
           <a:xfrm>
-            <a:off x="5360116" y="1128156"/>
+            <a:off x="1231178" y="4823856"/>
             <a:ext cx="990600" cy="552450"/>
           </a:xfrm>
           <a:prstGeom prst="rect">
@@ -4990,7 +4990,7 @@
         </p:nvSpPr>
         <p:spPr>
           <a:xfrm>
-            <a:off x="5242960" y="988885"/>
+            <a:off x="1114022" y="4684585"/>
             <a:ext cx="2475736" cy="856297"/>
           </a:xfrm>
           <a:prstGeom prst="rect">
@@ -5036,7 +5036,7 @@
         </p:nvCxnSpPr>
         <p:spPr>
           <a:xfrm flipH="1">
-            <a:off x="5980582" y="1210349"/>
+            <a:off x="1851644" y="4906049"/>
             <a:ext cx="962942" cy="2"/>
           </a:xfrm>
           <a:prstGeom prst="straightConnector1">
@@ -5069,7 +5069,172 @@
         </p:nvSpPr>
         <p:spPr>
           <a:xfrm>
-            <a:off x="6943524" y="1025461"/>
+            <a:off x="2814586" y="4721161"/>
+            <a:ext cx="775172" cy="369776"/>
+          </a:xfrm>
+          <a:prstGeom prst="rect">
+            <a:avLst/>
+          </a:prstGeom>
+          <a:noFill/>
+          <a:ln>
+            <a:noFill/>
+          </a:ln>
+        </p:spPr>
+        <p:style>
+          <a:lnRef idx="2">
+            <a:schemeClr val="accent1">
+              <a:shade val="50000"/>
+            </a:schemeClr>
+          </a:lnRef>
+          <a:fillRef idx="1">
+            <a:schemeClr val="accent1"/>
+          </a:fillRef>
+          <a:effectRef idx="0">
+            <a:schemeClr val="accent1"/>
+          </a:effectRef>
+          <a:fontRef idx="minor">
+            <a:schemeClr val="lt1"/>
+          </a:fontRef>
+        </p:style>
+        <p:txBody>
+          <a:bodyPr rtlCol="0" anchor="t"/>
+          <a:lstStyle/>
+          <a:p>
+            <a:r>
+              <a:rPr kumimoji="1" lang="en-US" altLang="ja-JP" sz="1600" dirty="0" smtClean="0">
+                <a:solidFill>
+                  <a:schemeClr val="tx1"/>
+                </a:solidFill>
+              </a:rPr>
+              <a:t>click</a:t>
+            </a:r>
+            <a:endParaRPr kumimoji="1" lang="ja-JP" altLang="en-US" sz="1600" dirty="0">
+              <a:solidFill>
+                <a:schemeClr val="tx1"/>
+              </a:solidFill>
+            </a:endParaRPr>
+          </a:p>
+        </p:txBody>
+      </p:sp>
+      <p:pic>
+        <p:nvPicPr>
+          <p:cNvPr id="15" name="Picture 11"/>
+          <p:cNvPicPr>
+            <a:picLocks noChangeAspect="1" noChangeArrowheads="1"/>
+          </p:cNvPicPr>
+          <p:nvPr/>
+        </p:nvPicPr>
+        <p:blipFill>
+          <a:blip r:embed="rId4"/>
+          <a:srcRect/>
+          <a:stretch>
+            <a:fillRect/>
+          </a:stretch>
+        </p:blipFill>
+        <p:spPr bwMode="auto">
+          <a:xfrm>
+            <a:off x="4670615" y="4822640"/>
+            <a:ext cx="1285875" cy="533400"/>
+          </a:xfrm>
+          <a:prstGeom prst="rect">
+            <a:avLst/>
+          </a:prstGeom>
+          <a:noFill/>
+          <a:ln w="9525">
+            <a:noFill/>
+            <a:miter lim="800000"/>
+            <a:headEnd/>
+            <a:tailEnd/>
+          </a:ln>
+          <a:effectLst/>
+        </p:spPr>
+      </p:pic>
+      <p:sp>
+        <p:nvSpPr>
+          <p:cNvPr id="16" name="正方形/長方形 15"/>
+          <p:cNvSpPr/>
+          <p:nvPr/>
+        </p:nvSpPr>
+        <p:spPr>
+          <a:xfrm>
+            <a:off x="4543552" y="4685414"/>
+            <a:ext cx="2475736" cy="859536"/>
+          </a:xfrm>
+          <a:prstGeom prst="rect">
+            <a:avLst/>
+          </a:prstGeom>
+          <a:noFill/>
+          <a:ln w="19050">
+            <a:solidFill>
+              <a:schemeClr val="tx1"/>
+            </a:solidFill>
+          </a:ln>
+        </p:spPr>
+        <p:style>
+          <a:lnRef idx="1">
+            <a:schemeClr val="accent1"/>
+          </a:lnRef>
+          <a:fillRef idx="3">
+            <a:schemeClr val="accent1"/>
+          </a:fillRef>
+          <a:effectRef idx="2">
+            <a:schemeClr val="accent1"/>
+          </a:effectRef>
+          <a:fontRef idx="minor">
+            <a:schemeClr val="lt1"/>
+          </a:fontRef>
+        </p:style>
+        <p:txBody>
+          <a:bodyPr rtlCol="0" anchor="ctr"/>
+          <a:lstStyle/>
+          <a:p>
+            <a:pPr algn="ctr"/>
+            <a:endParaRPr kumimoji="1" lang="ja-JP" altLang="en-US" dirty="0"/>
+          </a:p>
+        </p:txBody>
+      </p:sp>
+      <p:cxnSp>
+        <p:nvCxnSpPr>
+          <p:cNvPr id="17" name="直線矢印コネクタ 16"/>
+          <p:cNvCxnSpPr/>
+          <p:nvPr/>
+        </p:nvCxnSpPr>
+        <p:spPr>
+          <a:xfrm rot="10800000">
+            <a:off x="5300222" y="5087752"/>
+            <a:ext cx="927132" cy="1588"/>
+          </a:xfrm>
+          <a:prstGeom prst="straightConnector1">
+            <a:avLst/>
+          </a:prstGeom>
+          <a:ln>
+            <a:tailEnd type="arrow"/>
+          </a:ln>
+        </p:spPr>
+        <p:style>
+          <a:lnRef idx="2">
+            <a:schemeClr val="accent1"/>
+          </a:lnRef>
+          <a:fillRef idx="0">
+            <a:schemeClr val="accent1"/>
+          </a:fillRef>
+          <a:effectRef idx="1">
+            <a:schemeClr val="accent1"/>
+          </a:effectRef>
+          <a:fontRef idx="minor">
+            <a:schemeClr val="tx1"/>
+          </a:fontRef>
+        </p:style>
+      </p:cxnSp>
+      <p:sp>
+        <p:nvSpPr>
+          <p:cNvPr id="18" name="正方形/長方形 17"/>
+          <p:cNvSpPr/>
+          <p:nvPr/>
+        </p:nvSpPr>
+        <p:spPr>
+          <a:xfrm>
+            <a:off x="6294916" y="4906051"/>
             <a:ext cx="775172" cy="369776"/>
           </a:xfrm>
           <a:prstGeom prst="rect">

</xml_diff>